<commit_message>
Refactor retro-flex cardia to retro-flex fundus
</commit_message>
<xml_diff>
--- a/Data/ExampleSites/diagram.pptx
+++ b/Data/ExampleSites/diagram.pptx
@@ -104,6 +104,11 @@
       </a:defRPr>
     </a:lvl9pPr>
   </p:defaultTextStyle>
+  <p:extLst>
+    <p:ext uri="{EFAFB233-063F-42B5-8137-9DF3F51BA10A}">
+      <p15:sldGuideLst xmlns:p15="http://schemas.microsoft.com/office/powerpoint/2012/main"/>
+    </p:ext>
+  </p:extLst>
 </p:presentation>
 </file>
 
@@ -4488,7 +4493,7 @@
             <a:pPr algn="ctr"/>
             <a:r>
               <a:rPr lang="fr-BE" sz="1200" b="1" dirty="0"/>
-              <a:t>7 – cardia </a:t>
+              <a:t>8 – fundus </a:t>
             </a:r>
             <a:r>
               <a:rPr lang="fr-BE" sz="1200" b="1" dirty="0" err="1"/>

</xml_diff>